<commit_message>
commandPattern: Fix typos in diagrams
</commit_message>
<xml_diff>
--- a/diagrams/designPatterns/command/whatItIs/clientInvoker.pptx
+++ b/diagrams/designPatterns/command/whatItIs/clientInvoker.pptx
@@ -107,6 +107,22 @@
       </a:defRPr>
     </a:lvl9pPr>
   </p:defaultTextStyle>
+  <p:extLst>
+    <p:ext uri="{EFAFB233-063F-42B5-8137-9DF3F51BA10A}">
+      <p15:sldGuideLst xmlns:p15="http://schemas.microsoft.com/office/powerpoint/2012/main">
+        <p15:guide id="1" orient="horz" pos="2160">
+          <p15:clr>
+            <a:srgbClr val="A4A3A4"/>
+          </p15:clr>
+        </p15:guide>
+        <p15:guide id="2" pos="2880">
+          <p15:clr>
+            <a:srgbClr val="A4A3A4"/>
+          </p15:clr>
+        </p15:guide>
+      </p15:sldGuideLst>
+    </p:ext>
+  </p:extLst>
 </p:presentation>
 </file>
 
@@ -192,7 +208,7 @@
           <a:p>
             <a:fld id="{66906C45-2DB0-4797-8F62-CAF8E935D413}" type="datetimeFigureOut">
               <a:rPr lang="en-SG" smtClean="0"/>
-              <a:t>23/6/2017</a:t>
+              <a:t>17/10/2020</a:t>
             </a:fld>
             <a:endParaRPr lang="en-SG"/>
           </a:p>
@@ -725,7 +741,7 @@
           <a:p>
             <a:fld id="{8486F480-15A6-4026-BC99-052F8E994139}" type="datetimeFigureOut">
               <a:rPr lang="en-SG" smtClean="0"/>
-              <a:t>23/6/2017</a:t>
+              <a:t>17/10/2020</a:t>
             </a:fld>
             <a:endParaRPr lang="en-SG"/>
           </a:p>
@@ -895,7 +911,7 @@
           <a:p>
             <a:fld id="{8486F480-15A6-4026-BC99-052F8E994139}" type="datetimeFigureOut">
               <a:rPr lang="en-SG" smtClean="0"/>
-              <a:t>23/6/2017</a:t>
+              <a:t>17/10/2020</a:t>
             </a:fld>
             <a:endParaRPr lang="en-SG"/>
           </a:p>
@@ -1075,7 +1091,7 @@
           <a:p>
             <a:fld id="{8486F480-15A6-4026-BC99-052F8E994139}" type="datetimeFigureOut">
               <a:rPr lang="en-SG" smtClean="0"/>
-              <a:t>23/6/2017</a:t>
+              <a:t>17/10/2020</a:t>
             </a:fld>
             <a:endParaRPr lang="en-SG"/>
           </a:p>
@@ -1245,7 +1261,7 @@
           <a:p>
             <a:fld id="{8486F480-15A6-4026-BC99-052F8E994139}" type="datetimeFigureOut">
               <a:rPr lang="en-SG" smtClean="0"/>
-              <a:t>23/6/2017</a:t>
+              <a:t>17/10/2020</a:t>
             </a:fld>
             <a:endParaRPr lang="en-SG"/>
           </a:p>
@@ -1491,7 +1507,7 @@
           <a:p>
             <a:fld id="{8486F480-15A6-4026-BC99-052F8E994139}" type="datetimeFigureOut">
               <a:rPr lang="en-SG" smtClean="0"/>
-              <a:t>23/6/2017</a:t>
+              <a:t>17/10/2020</a:t>
             </a:fld>
             <a:endParaRPr lang="en-SG"/>
           </a:p>
@@ -1779,7 +1795,7 @@
           <a:p>
             <a:fld id="{8486F480-15A6-4026-BC99-052F8E994139}" type="datetimeFigureOut">
               <a:rPr lang="en-SG" smtClean="0"/>
-              <a:t>23/6/2017</a:t>
+              <a:t>17/10/2020</a:t>
             </a:fld>
             <a:endParaRPr lang="en-SG"/>
           </a:p>
@@ -2201,7 +2217,7 @@
           <a:p>
             <a:fld id="{8486F480-15A6-4026-BC99-052F8E994139}" type="datetimeFigureOut">
               <a:rPr lang="en-SG" smtClean="0"/>
-              <a:t>23/6/2017</a:t>
+              <a:t>17/10/2020</a:t>
             </a:fld>
             <a:endParaRPr lang="en-SG"/>
           </a:p>
@@ -2319,7 +2335,7 @@
           <a:p>
             <a:fld id="{8486F480-15A6-4026-BC99-052F8E994139}" type="datetimeFigureOut">
               <a:rPr lang="en-SG" smtClean="0"/>
-              <a:t>23/6/2017</a:t>
+              <a:t>17/10/2020</a:t>
             </a:fld>
             <a:endParaRPr lang="en-SG"/>
           </a:p>
@@ -2414,7 +2430,7 @@
           <a:p>
             <a:fld id="{8486F480-15A6-4026-BC99-052F8E994139}" type="datetimeFigureOut">
               <a:rPr lang="en-SG" smtClean="0"/>
-              <a:t>23/6/2017</a:t>
+              <a:t>17/10/2020</a:t>
             </a:fld>
             <a:endParaRPr lang="en-SG"/>
           </a:p>
@@ -2691,7 +2707,7 @@
           <a:p>
             <a:fld id="{8486F480-15A6-4026-BC99-052F8E994139}" type="datetimeFigureOut">
               <a:rPr lang="en-SG" smtClean="0"/>
-              <a:t>23/6/2017</a:t>
+              <a:t>17/10/2020</a:t>
             </a:fld>
             <a:endParaRPr lang="en-SG"/>
           </a:p>
@@ -2944,7 +2960,7 @@
           <a:p>
             <a:fld id="{8486F480-15A6-4026-BC99-052F8E994139}" type="datetimeFigureOut">
               <a:rPr lang="en-SG" smtClean="0"/>
-              <a:t>23/6/2017</a:t>
+              <a:t>17/10/2020</a:t>
             </a:fld>
             <a:endParaRPr lang="en-SG"/>
           </a:p>
@@ -3157,7 +3173,7 @@
           <a:p>
             <a:fld id="{8486F480-15A6-4026-BC99-052F8E994139}" type="datetimeFigureOut">
               <a:rPr lang="en-SG" smtClean="0"/>
-              <a:t>23/6/2017</a:t>
+              <a:t>17/10/2020</a:t>
             </a:fld>
             <a:endParaRPr lang="en-SG"/>
           </a:p>
@@ -3657,8 +3673,8 @@
         </p:nvSpPr>
         <p:spPr bwMode="auto">
           <a:xfrm>
-            <a:off x="5589927" y="4796758"/>
-            <a:ext cx="2715873" cy="400110"/>
+            <a:off x="5527186" y="4796758"/>
+            <a:ext cx="2841355" cy="400110"/>
           </a:xfrm>
           <a:prstGeom prst="rect">
             <a:avLst/>
@@ -3696,7 +3712,25 @@
                 </a:solidFill>
                 <a:latin typeface="Calibri" pitchFamily="34" charset="0"/>
               </a:rPr>
-              <a:t>&lt;&lt;ConcretCommand1&gt;&gt;</a:t>
+              <a:t>&lt;&lt;</a:t>
+            </a:r>
+            <a:r>
+              <a:rPr lang="en-US" sz="2000" b="0" dirty="0" smtClean="0">
+                <a:solidFill>
+                  <a:schemeClr val="tx1"/>
+                </a:solidFill>
+                <a:latin typeface="Calibri" pitchFamily="34" charset="0"/>
+              </a:rPr>
+              <a:t>ConcreteCommand1</a:t>
+            </a:r>
+            <a:r>
+              <a:rPr lang="en-US" sz="2000" b="0" dirty="0" smtClean="0">
+                <a:solidFill>
+                  <a:schemeClr val="tx1"/>
+                </a:solidFill>
+                <a:latin typeface="Calibri" pitchFamily="34" charset="0"/>
+              </a:rPr>
+              <a:t>&gt;&gt;</a:t>
             </a:r>
             <a:endParaRPr lang="en-US" sz="2000" b="0" dirty="0">
               <a:solidFill>
@@ -3786,8 +3820,8 @@
         </p:nvSpPr>
         <p:spPr bwMode="auto">
           <a:xfrm>
-            <a:off x="1981200" y="5029200"/>
-            <a:ext cx="1057084" cy="369332"/>
+            <a:off x="1986009" y="5029200"/>
+            <a:ext cx="1047466" cy="369332"/>
           </a:xfrm>
           <a:prstGeom prst="rect">
             <a:avLst/>
@@ -3814,7 +3848,7 @@
                 </a:solidFill>
                 <a:latin typeface="Calibri" pitchFamily="34" charset="0"/>
               </a:rPr>
-              <a:t>creates &gt;</a:t>
+              <a:t>creates   </a:t>
             </a:r>
             <a:endParaRPr lang="en-US" sz="1800" b="0" dirty="0">
               <a:solidFill>
@@ -4229,11 +4263,11 @@
         <p:spPr>
           <a:xfrm>
             <a:off x="1524000" y="3676710"/>
-            <a:ext cx="4065927" cy="1320103"/>
+            <a:ext cx="4003186" cy="1320103"/>
           </a:xfrm>
           <a:prstGeom prst="bentConnector3">
             <a:avLst>
-              <a:gd name="adj1" fmla="val 486"/>
+              <a:gd name="adj1" fmla="val -740"/>
             </a:avLst>
           </a:prstGeom>
           <a:ln>
@@ -4266,8 +4300,8 @@
         </p:nvSpPr>
         <p:spPr bwMode="auto">
           <a:xfrm>
-            <a:off x="1339087" y="2743200"/>
-            <a:ext cx="2798523" cy="369332"/>
+            <a:off x="1370346" y="2743200"/>
+            <a:ext cx="2736005" cy="369332"/>
           </a:xfrm>
           <a:prstGeom prst="rect">
             <a:avLst/>
@@ -4300,16 +4334,13 @@
               <a:rPr lang="en-US" sz="1800" dirty="0" smtClean="0">
                 <a:latin typeface="Calibri" pitchFamily="34" charset="0"/>
               </a:rPr>
-              <a:t>Command objects to</a:t>
-            </a:r>
-            <a:r>
-              <a:rPr lang="en-US" sz="1800" b="0" dirty="0" smtClean="0">
-                <a:solidFill>
-                  <a:schemeClr val="tx1"/>
-                </a:solidFill>
+              <a:t>Command objects </a:t>
+            </a:r>
+            <a:r>
+              <a:rPr lang="en-US" sz="1800" dirty="0" smtClean="0">
                 <a:latin typeface="Calibri" pitchFamily="34" charset="0"/>
               </a:rPr>
-              <a:t> &gt;</a:t>
+              <a:t>to  </a:t>
             </a:r>
             <a:endParaRPr lang="en-US" sz="1800" b="0" dirty="0">
               <a:solidFill>
@@ -4418,8 +4449,8 @@
         </p:nvSpPr>
         <p:spPr bwMode="auto">
           <a:xfrm>
-            <a:off x="5032016" y="3549134"/>
-            <a:ext cx="1119987" cy="369332"/>
+            <a:off x="5089725" y="3549134"/>
+            <a:ext cx="1004569" cy="369332"/>
           </a:xfrm>
           <a:prstGeom prst="rect">
             <a:avLst/>
@@ -4446,7 +4477,7 @@
                 </a:solidFill>
                 <a:latin typeface="Calibri" pitchFamily="34" charset="0"/>
               </a:rPr>
-              <a:t>executes&gt;</a:t>
+              <a:t>executes</a:t>
             </a:r>
             <a:endParaRPr lang="en-US" sz="1800" b="0" dirty="0">
               <a:solidFill>
@@ -4503,6 +4534,144 @@
               </a:solidFill>
               <a:latin typeface="Calibri" pitchFamily="34" charset="0"/>
             </a:endParaRPr>
+          </a:p>
+        </p:txBody>
+      </p:sp>
+      <p:sp>
+        <p:nvSpPr>
+          <p:cNvPr id="3" name="Isosceles Triangle 2"/>
+          <p:cNvSpPr/>
+          <p:nvPr/>
+        </p:nvSpPr>
+        <p:spPr>
+          <a:xfrm rot="5400000">
+            <a:off x="6009528" y="3711511"/>
+            <a:ext cx="178532" cy="108202"/>
+          </a:xfrm>
+          <a:prstGeom prst="triangle">
+            <a:avLst/>
+          </a:prstGeom>
+          <a:solidFill>
+            <a:schemeClr val="tx1"/>
+          </a:solidFill>
+          <a:ln>
+            <a:noFill/>
+          </a:ln>
+        </p:spPr>
+        <p:style>
+          <a:lnRef idx="2">
+            <a:schemeClr val="accent1">
+              <a:shade val="50000"/>
+            </a:schemeClr>
+          </a:lnRef>
+          <a:fillRef idx="1">
+            <a:schemeClr val="accent1"/>
+          </a:fillRef>
+          <a:effectRef idx="0">
+            <a:schemeClr val="accent1"/>
+          </a:effectRef>
+          <a:fontRef idx="minor">
+            <a:schemeClr val="lt1"/>
+          </a:fontRef>
+        </p:style>
+        <p:txBody>
+          <a:bodyPr rtlCol="0" anchor="ctr"/>
+          <a:lstStyle/>
+          <a:p>
+            <a:pPr algn="ctr"/>
+            <a:endParaRPr lang="en-US"/>
+          </a:p>
+        </p:txBody>
+      </p:sp>
+      <p:sp>
+        <p:nvSpPr>
+          <p:cNvPr id="24" name="Isosceles Triangle 23"/>
+          <p:cNvSpPr/>
+          <p:nvPr/>
+        </p:nvSpPr>
+        <p:spPr>
+          <a:xfrm rot="5400000">
+            <a:off x="2794872" y="5190325"/>
+            <a:ext cx="178532" cy="108202"/>
+          </a:xfrm>
+          <a:prstGeom prst="triangle">
+            <a:avLst/>
+          </a:prstGeom>
+          <a:solidFill>
+            <a:schemeClr val="tx1"/>
+          </a:solidFill>
+          <a:ln>
+            <a:noFill/>
+          </a:ln>
+        </p:spPr>
+        <p:style>
+          <a:lnRef idx="2">
+            <a:schemeClr val="accent1">
+              <a:shade val="50000"/>
+            </a:schemeClr>
+          </a:lnRef>
+          <a:fillRef idx="1">
+            <a:schemeClr val="accent1"/>
+          </a:fillRef>
+          <a:effectRef idx="0">
+            <a:schemeClr val="accent1"/>
+          </a:effectRef>
+          <a:fontRef idx="minor">
+            <a:schemeClr val="lt1"/>
+          </a:fontRef>
+        </p:style>
+        <p:txBody>
+          <a:bodyPr rtlCol="0" anchor="ctr"/>
+          <a:lstStyle/>
+          <a:p>
+            <a:pPr algn="ctr"/>
+            <a:endParaRPr lang="en-US"/>
+          </a:p>
+        </p:txBody>
+      </p:sp>
+      <p:sp>
+        <p:nvSpPr>
+          <p:cNvPr id="25" name="Isosceles Triangle 24"/>
+          <p:cNvSpPr/>
+          <p:nvPr/>
+        </p:nvSpPr>
+        <p:spPr>
+          <a:xfrm rot="5400000">
+            <a:off x="3888763" y="2892953"/>
+            <a:ext cx="178532" cy="108202"/>
+          </a:xfrm>
+          <a:prstGeom prst="triangle">
+            <a:avLst/>
+          </a:prstGeom>
+          <a:solidFill>
+            <a:schemeClr val="tx1"/>
+          </a:solidFill>
+          <a:ln>
+            <a:noFill/>
+          </a:ln>
+        </p:spPr>
+        <p:style>
+          <a:lnRef idx="2">
+            <a:schemeClr val="accent1">
+              <a:shade val="50000"/>
+            </a:schemeClr>
+          </a:lnRef>
+          <a:fillRef idx="1">
+            <a:schemeClr val="accent1"/>
+          </a:fillRef>
+          <a:effectRef idx="0">
+            <a:schemeClr val="accent1"/>
+          </a:effectRef>
+          <a:fontRef idx="minor">
+            <a:schemeClr val="lt1"/>
+          </a:fontRef>
+        </p:style>
+        <p:txBody>
+          <a:bodyPr rtlCol="0" anchor="ctr"/>
+          <a:lstStyle/>
+          <a:p>
+            <a:pPr algn="ctr"/>
+            <a:endParaRPr lang="en-US"/>
           </a:p>
         </p:txBody>
       </p:sp>

</xml_diff>

<commit_message>
Deploy se-edu/se-book to github.com/se-edu/se-book.git:gh-pages
</commit_message>
<xml_diff>
--- a/diagrams/designPatterns/command/whatItIs/clientInvoker.pptx
+++ b/diagrams/designPatterns/command/whatItIs/clientInvoker.pptx
@@ -107,6 +107,22 @@
       </a:defRPr>
     </a:lvl9pPr>
   </p:defaultTextStyle>
+  <p:extLst>
+    <p:ext uri="{EFAFB233-063F-42B5-8137-9DF3F51BA10A}">
+      <p15:sldGuideLst xmlns:p15="http://schemas.microsoft.com/office/powerpoint/2012/main">
+        <p15:guide id="1" orient="horz" pos="2160">
+          <p15:clr>
+            <a:srgbClr val="A4A3A4"/>
+          </p15:clr>
+        </p15:guide>
+        <p15:guide id="2" pos="2880">
+          <p15:clr>
+            <a:srgbClr val="A4A3A4"/>
+          </p15:clr>
+        </p15:guide>
+      </p15:sldGuideLst>
+    </p:ext>
+  </p:extLst>
 </p:presentation>
 </file>
 
@@ -192,7 +208,7 @@
           <a:p>
             <a:fld id="{66906C45-2DB0-4797-8F62-CAF8E935D413}" type="datetimeFigureOut">
               <a:rPr lang="en-SG" smtClean="0"/>
-              <a:t>23/6/2017</a:t>
+              <a:t>17/10/2020</a:t>
             </a:fld>
             <a:endParaRPr lang="en-SG"/>
           </a:p>
@@ -725,7 +741,7 @@
           <a:p>
             <a:fld id="{8486F480-15A6-4026-BC99-052F8E994139}" type="datetimeFigureOut">
               <a:rPr lang="en-SG" smtClean="0"/>
-              <a:t>23/6/2017</a:t>
+              <a:t>17/10/2020</a:t>
             </a:fld>
             <a:endParaRPr lang="en-SG"/>
           </a:p>
@@ -895,7 +911,7 @@
           <a:p>
             <a:fld id="{8486F480-15A6-4026-BC99-052F8E994139}" type="datetimeFigureOut">
               <a:rPr lang="en-SG" smtClean="0"/>
-              <a:t>23/6/2017</a:t>
+              <a:t>17/10/2020</a:t>
             </a:fld>
             <a:endParaRPr lang="en-SG"/>
           </a:p>
@@ -1075,7 +1091,7 @@
           <a:p>
             <a:fld id="{8486F480-15A6-4026-BC99-052F8E994139}" type="datetimeFigureOut">
               <a:rPr lang="en-SG" smtClean="0"/>
-              <a:t>23/6/2017</a:t>
+              <a:t>17/10/2020</a:t>
             </a:fld>
             <a:endParaRPr lang="en-SG"/>
           </a:p>
@@ -1245,7 +1261,7 @@
           <a:p>
             <a:fld id="{8486F480-15A6-4026-BC99-052F8E994139}" type="datetimeFigureOut">
               <a:rPr lang="en-SG" smtClean="0"/>
-              <a:t>23/6/2017</a:t>
+              <a:t>17/10/2020</a:t>
             </a:fld>
             <a:endParaRPr lang="en-SG"/>
           </a:p>
@@ -1491,7 +1507,7 @@
           <a:p>
             <a:fld id="{8486F480-15A6-4026-BC99-052F8E994139}" type="datetimeFigureOut">
               <a:rPr lang="en-SG" smtClean="0"/>
-              <a:t>23/6/2017</a:t>
+              <a:t>17/10/2020</a:t>
             </a:fld>
             <a:endParaRPr lang="en-SG"/>
           </a:p>
@@ -1779,7 +1795,7 @@
           <a:p>
             <a:fld id="{8486F480-15A6-4026-BC99-052F8E994139}" type="datetimeFigureOut">
               <a:rPr lang="en-SG" smtClean="0"/>
-              <a:t>23/6/2017</a:t>
+              <a:t>17/10/2020</a:t>
             </a:fld>
             <a:endParaRPr lang="en-SG"/>
           </a:p>
@@ -2201,7 +2217,7 @@
           <a:p>
             <a:fld id="{8486F480-15A6-4026-BC99-052F8E994139}" type="datetimeFigureOut">
               <a:rPr lang="en-SG" smtClean="0"/>
-              <a:t>23/6/2017</a:t>
+              <a:t>17/10/2020</a:t>
             </a:fld>
             <a:endParaRPr lang="en-SG"/>
           </a:p>
@@ -2319,7 +2335,7 @@
           <a:p>
             <a:fld id="{8486F480-15A6-4026-BC99-052F8E994139}" type="datetimeFigureOut">
               <a:rPr lang="en-SG" smtClean="0"/>
-              <a:t>23/6/2017</a:t>
+              <a:t>17/10/2020</a:t>
             </a:fld>
             <a:endParaRPr lang="en-SG"/>
           </a:p>
@@ -2414,7 +2430,7 @@
           <a:p>
             <a:fld id="{8486F480-15A6-4026-BC99-052F8E994139}" type="datetimeFigureOut">
               <a:rPr lang="en-SG" smtClean="0"/>
-              <a:t>23/6/2017</a:t>
+              <a:t>17/10/2020</a:t>
             </a:fld>
             <a:endParaRPr lang="en-SG"/>
           </a:p>
@@ -2691,7 +2707,7 @@
           <a:p>
             <a:fld id="{8486F480-15A6-4026-BC99-052F8E994139}" type="datetimeFigureOut">
               <a:rPr lang="en-SG" smtClean="0"/>
-              <a:t>23/6/2017</a:t>
+              <a:t>17/10/2020</a:t>
             </a:fld>
             <a:endParaRPr lang="en-SG"/>
           </a:p>
@@ -2944,7 +2960,7 @@
           <a:p>
             <a:fld id="{8486F480-15A6-4026-BC99-052F8E994139}" type="datetimeFigureOut">
               <a:rPr lang="en-SG" smtClean="0"/>
-              <a:t>23/6/2017</a:t>
+              <a:t>17/10/2020</a:t>
             </a:fld>
             <a:endParaRPr lang="en-SG"/>
           </a:p>
@@ -3157,7 +3173,7 @@
           <a:p>
             <a:fld id="{8486F480-15A6-4026-BC99-052F8E994139}" type="datetimeFigureOut">
               <a:rPr lang="en-SG" smtClean="0"/>
-              <a:t>23/6/2017</a:t>
+              <a:t>17/10/2020</a:t>
             </a:fld>
             <a:endParaRPr lang="en-SG"/>
           </a:p>
@@ -3657,8 +3673,8 @@
         </p:nvSpPr>
         <p:spPr bwMode="auto">
           <a:xfrm>
-            <a:off x="5589927" y="4796758"/>
-            <a:ext cx="2715873" cy="400110"/>
+            <a:off x="5527186" y="4796758"/>
+            <a:ext cx="2841355" cy="400110"/>
           </a:xfrm>
           <a:prstGeom prst="rect">
             <a:avLst/>
@@ -3696,7 +3712,25 @@
                 </a:solidFill>
                 <a:latin typeface="Calibri" pitchFamily="34" charset="0"/>
               </a:rPr>
-              <a:t>&lt;&lt;ConcretCommand1&gt;&gt;</a:t>
+              <a:t>&lt;&lt;</a:t>
+            </a:r>
+            <a:r>
+              <a:rPr lang="en-US" sz="2000" b="0" dirty="0" smtClean="0">
+                <a:solidFill>
+                  <a:schemeClr val="tx1"/>
+                </a:solidFill>
+                <a:latin typeface="Calibri" pitchFamily="34" charset="0"/>
+              </a:rPr>
+              <a:t>ConcreteCommand1</a:t>
+            </a:r>
+            <a:r>
+              <a:rPr lang="en-US" sz="2000" b="0" dirty="0" smtClean="0">
+                <a:solidFill>
+                  <a:schemeClr val="tx1"/>
+                </a:solidFill>
+                <a:latin typeface="Calibri" pitchFamily="34" charset="0"/>
+              </a:rPr>
+              <a:t>&gt;&gt;</a:t>
             </a:r>
             <a:endParaRPr lang="en-US" sz="2000" b="0" dirty="0">
               <a:solidFill>
@@ -3786,8 +3820,8 @@
         </p:nvSpPr>
         <p:spPr bwMode="auto">
           <a:xfrm>
-            <a:off x="1981200" y="5029200"/>
-            <a:ext cx="1057084" cy="369332"/>
+            <a:off x="1986009" y="5029200"/>
+            <a:ext cx="1047466" cy="369332"/>
           </a:xfrm>
           <a:prstGeom prst="rect">
             <a:avLst/>
@@ -3814,7 +3848,7 @@
                 </a:solidFill>
                 <a:latin typeface="Calibri" pitchFamily="34" charset="0"/>
               </a:rPr>
-              <a:t>creates &gt;</a:t>
+              <a:t>creates   </a:t>
             </a:r>
             <a:endParaRPr lang="en-US" sz="1800" b="0" dirty="0">
               <a:solidFill>
@@ -4229,11 +4263,11 @@
         <p:spPr>
           <a:xfrm>
             <a:off x="1524000" y="3676710"/>
-            <a:ext cx="4065927" cy="1320103"/>
+            <a:ext cx="4003186" cy="1320103"/>
           </a:xfrm>
           <a:prstGeom prst="bentConnector3">
             <a:avLst>
-              <a:gd name="adj1" fmla="val 486"/>
+              <a:gd name="adj1" fmla="val -740"/>
             </a:avLst>
           </a:prstGeom>
           <a:ln>
@@ -4266,8 +4300,8 @@
         </p:nvSpPr>
         <p:spPr bwMode="auto">
           <a:xfrm>
-            <a:off x="1339087" y="2743200"/>
-            <a:ext cx="2798523" cy="369332"/>
+            <a:off x="1370346" y="2743200"/>
+            <a:ext cx="2736005" cy="369332"/>
           </a:xfrm>
           <a:prstGeom prst="rect">
             <a:avLst/>
@@ -4300,16 +4334,13 @@
               <a:rPr lang="en-US" sz="1800" dirty="0" smtClean="0">
                 <a:latin typeface="Calibri" pitchFamily="34" charset="0"/>
               </a:rPr>
-              <a:t>Command objects to</a:t>
-            </a:r>
-            <a:r>
-              <a:rPr lang="en-US" sz="1800" b="0" dirty="0" smtClean="0">
-                <a:solidFill>
-                  <a:schemeClr val="tx1"/>
-                </a:solidFill>
+              <a:t>Command objects </a:t>
+            </a:r>
+            <a:r>
+              <a:rPr lang="en-US" sz="1800" dirty="0" smtClean="0">
                 <a:latin typeface="Calibri" pitchFamily="34" charset="0"/>
               </a:rPr>
-              <a:t> &gt;</a:t>
+              <a:t>to  </a:t>
             </a:r>
             <a:endParaRPr lang="en-US" sz="1800" b="0" dirty="0">
               <a:solidFill>
@@ -4418,8 +4449,8 @@
         </p:nvSpPr>
         <p:spPr bwMode="auto">
           <a:xfrm>
-            <a:off x="5032016" y="3549134"/>
-            <a:ext cx="1119987" cy="369332"/>
+            <a:off x="5089725" y="3549134"/>
+            <a:ext cx="1004569" cy="369332"/>
           </a:xfrm>
           <a:prstGeom prst="rect">
             <a:avLst/>
@@ -4446,7 +4477,7 @@
                 </a:solidFill>
                 <a:latin typeface="Calibri" pitchFamily="34" charset="0"/>
               </a:rPr>
-              <a:t>executes&gt;</a:t>
+              <a:t>executes</a:t>
             </a:r>
             <a:endParaRPr lang="en-US" sz="1800" b="0" dirty="0">
               <a:solidFill>
@@ -4503,6 +4534,144 @@
               </a:solidFill>
               <a:latin typeface="Calibri" pitchFamily="34" charset="0"/>
             </a:endParaRPr>
+          </a:p>
+        </p:txBody>
+      </p:sp>
+      <p:sp>
+        <p:nvSpPr>
+          <p:cNvPr id="3" name="Isosceles Triangle 2"/>
+          <p:cNvSpPr/>
+          <p:nvPr/>
+        </p:nvSpPr>
+        <p:spPr>
+          <a:xfrm rot="5400000">
+            <a:off x="6009528" y="3711511"/>
+            <a:ext cx="178532" cy="108202"/>
+          </a:xfrm>
+          <a:prstGeom prst="triangle">
+            <a:avLst/>
+          </a:prstGeom>
+          <a:solidFill>
+            <a:schemeClr val="tx1"/>
+          </a:solidFill>
+          <a:ln>
+            <a:noFill/>
+          </a:ln>
+        </p:spPr>
+        <p:style>
+          <a:lnRef idx="2">
+            <a:schemeClr val="accent1">
+              <a:shade val="50000"/>
+            </a:schemeClr>
+          </a:lnRef>
+          <a:fillRef idx="1">
+            <a:schemeClr val="accent1"/>
+          </a:fillRef>
+          <a:effectRef idx="0">
+            <a:schemeClr val="accent1"/>
+          </a:effectRef>
+          <a:fontRef idx="minor">
+            <a:schemeClr val="lt1"/>
+          </a:fontRef>
+        </p:style>
+        <p:txBody>
+          <a:bodyPr rtlCol="0" anchor="ctr"/>
+          <a:lstStyle/>
+          <a:p>
+            <a:pPr algn="ctr"/>
+            <a:endParaRPr lang="en-US"/>
+          </a:p>
+        </p:txBody>
+      </p:sp>
+      <p:sp>
+        <p:nvSpPr>
+          <p:cNvPr id="24" name="Isosceles Triangle 23"/>
+          <p:cNvSpPr/>
+          <p:nvPr/>
+        </p:nvSpPr>
+        <p:spPr>
+          <a:xfrm rot="5400000">
+            <a:off x="2794872" y="5190325"/>
+            <a:ext cx="178532" cy="108202"/>
+          </a:xfrm>
+          <a:prstGeom prst="triangle">
+            <a:avLst/>
+          </a:prstGeom>
+          <a:solidFill>
+            <a:schemeClr val="tx1"/>
+          </a:solidFill>
+          <a:ln>
+            <a:noFill/>
+          </a:ln>
+        </p:spPr>
+        <p:style>
+          <a:lnRef idx="2">
+            <a:schemeClr val="accent1">
+              <a:shade val="50000"/>
+            </a:schemeClr>
+          </a:lnRef>
+          <a:fillRef idx="1">
+            <a:schemeClr val="accent1"/>
+          </a:fillRef>
+          <a:effectRef idx="0">
+            <a:schemeClr val="accent1"/>
+          </a:effectRef>
+          <a:fontRef idx="minor">
+            <a:schemeClr val="lt1"/>
+          </a:fontRef>
+        </p:style>
+        <p:txBody>
+          <a:bodyPr rtlCol="0" anchor="ctr"/>
+          <a:lstStyle/>
+          <a:p>
+            <a:pPr algn="ctr"/>
+            <a:endParaRPr lang="en-US"/>
+          </a:p>
+        </p:txBody>
+      </p:sp>
+      <p:sp>
+        <p:nvSpPr>
+          <p:cNvPr id="25" name="Isosceles Triangle 24"/>
+          <p:cNvSpPr/>
+          <p:nvPr/>
+        </p:nvSpPr>
+        <p:spPr>
+          <a:xfrm rot="5400000">
+            <a:off x="3888763" y="2892953"/>
+            <a:ext cx="178532" cy="108202"/>
+          </a:xfrm>
+          <a:prstGeom prst="triangle">
+            <a:avLst/>
+          </a:prstGeom>
+          <a:solidFill>
+            <a:schemeClr val="tx1"/>
+          </a:solidFill>
+          <a:ln>
+            <a:noFill/>
+          </a:ln>
+        </p:spPr>
+        <p:style>
+          <a:lnRef idx="2">
+            <a:schemeClr val="accent1">
+              <a:shade val="50000"/>
+            </a:schemeClr>
+          </a:lnRef>
+          <a:fillRef idx="1">
+            <a:schemeClr val="accent1"/>
+          </a:fillRef>
+          <a:effectRef idx="0">
+            <a:schemeClr val="accent1"/>
+          </a:effectRef>
+          <a:fontRef idx="minor">
+            <a:schemeClr val="lt1"/>
+          </a:fontRef>
+        </p:style>
+        <p:txBody>
+          <a:bodyPr rtlCol="0" anchor="ctr"/>
+          <a:lstStyle/>
+          <a:p>
+            <a:pPr algn="ctr"/>
+            <a:endParaRPr lang="en-US"/>
           </a:p>
         </p:txBody>
       </p:sp>

</xml_diff>

<commit_message>
Add <<create>> in command pattern
</commit_message>
<xml_diff>
--- a/diagrams/designPatterns/command/whatItIs/clientInvoker.pptx
+++ b/diagrams/designPatterns/command/whatItIs/clientInvoker.pptx
@@ -208,7 +208,7 @@
           <a:p>
             <a:fld id="{66906C45-2DB0-4797-8F62-CAF8E935D413}" type="datetimeFigureOut">
               <a:rPr lang="en-SG" smtClean="0"/>
-              <a:t>17/10/2020</a:t>
+              <a:t>1/1/26</a:t>
             </a:fld>
             <a:endParaRPr lang="en-SG"/>
           </a:p>
@@ -272,35 +272,35 @@
           <a:p>
             <a:pPr lvl="0"/>
             <a:r>
-              <a:rPr lang="en-US" smtClean="0"/>
+              <a:rPr lang="en-US"/>
               <a:t>Click to edit Master text styles</a:t>
             </a:r>
           </a:p>
           <a:p>
             <a:pPr lvl="1"/>
             <a:r>
-              <a:rPr lang="en-US" smtClean="0"/>
+              <a:rPr lang="en-US"/>
               <a:t>Second level</a:t>
             </a:r>
           </a:p>
           <a:p>
             <a:pPr lvl="2"/>
             <a:r>
-              <a:rPr lang="en-US" smtClean="0"/>
+              <a:rPr lang="en-US"/>
               <a:t>Third level</a:t>
             </a:r>
           </a:p>
           <a:p>
             <a:pPr lvl="3"/>
             <a:r>
-              <a:rPr lang="en-US" smtClean="0"/>
+              <a:rPr lang="en-US"/>
               <a:t>Fourth level</a:t>
             </a:r>
           </a:p>
           <a:p>
             <a:pPr lvl="4"/>
             <a:r>
-              <a:rPr lang="en-US" smtClean="0"/>
+              <a:rPr lang="en-US"/>
               <a:t>Fifth level</a:t>
             </a:r>
             <a:endParaRPr lang="en-SG"/>
@@ -598,7 +598,7 @@
           <a:lstStyle/>
           <a:p>
             <a:r>
-              <a:rPr lang="en-US" smtClean="0"/>
+              <a:rPr lang="en-US"/>
               <a:t>Click to edit Master title style</a:t>
             </a:r>
             <a:endParaRPr lang="en-SG"/>
@@ -717,7 +717,7 @@
           </a:lstStyle>
           <a:p>
             <a:r>
-              <a:rPr lang="en-US" smtClean="0"/>
+              <a:rPr lang="en-US"/>
               <a:t>Click to edit Master subtitle style</a:t>
             </a:r>
             <a:endParaRPr lang="en-SG"/>
@@ -741,7 +741,7 @@
           <a:p>
             <a:fld id="{8486F480-15A6-4026-BC99-052F8E994139}" type="datetimeFigureOut">
               <a:rPr lang="en-SG" smtClean="0"/>
-              <a:t>17/10/2020</a:t>
+              <a:t>1/1/26</a:t>
             </a:fld>
             <a:endParaRPr lang="en-SG"/>
           </a:p>
@@ -835,7 +835,7 @@
           <a:lstStyle/>
           <a:p>
             <a:r>
-              <a:rPr lang="en-US" smtClean="0"/>
+              <a:rPr lang="en-US"/>
               <a:t>Click to edit Master title style</a:t>
             </a:r>
             <a:endParaRPr lang="en-SG"/>
@@ -859,35 +859,35 @@
           <a:p>
             <a:pPr lvl="0"/>
             <a:r>
-              <a:rPr lang="en-US" smtClean="0"/>
+              <a:rPr lang="en-US"/>
               <a:t>Click to edit Master text styles</a:t>
             </a:r>
           </a:p>
           <a:p>
             <a:pPr lvl="1"/>
             <a:r>
-              <a:rPr lang="en-US" smtClean="0"/>
+              <a:rPr lang="en-US"/>
               <a:t>Second level</a:t>
             </a:r>
           </a:p>
           <a:p>
             <a:pPr lvl="2"/>
             <a:r>
-              <a:rPr lang="en-US" smtClean="0"/>
+              <a:rPr lang="en-US"/>
               <a:t>Third level</a:t>
             </a:r>
           </a:p>
           <a:p>
             <a:pPr lvl="3"/>
             <a:r>
-              <a:rPr lang="en-US" smtClean="0"/>
+              <a:rPr lang="en-US"/>
               <a:t>Fourth level</a:t>
             </a:r>
           </a:p>
           <a:p>
             <a:pPr lvl="4"/>
             <a:r>
-              <a:rPr lang="en-US" smtClean="0"/>
+              <a:rPr lang="en-US"/>
               <a:t>Fifth level</a:t>
             </a:r>
             <a:endParaRPr lang="en-SG"/>
@@ -911,7 +911,7 @@
           <a:p>
             <a:fld id="{8486F480-15A6-4026-BC99-052F8E994139}" type="datetimeFigureOut">
               <a:rPr lang="en-SG" smtClean="0"/>
-              <a:t>17/10/2020</a:t>
+              <a:t>1/1/26</a:t>
             </a:fld>
             <a:endParaRPr lang="en-SG"/>
           </a:p>
@@ -1010,7 +1010,7 @@
           <a:lstStyle/>
           <a:p>
             <a:r>
-              <a:rPr lang="en-US" smtClean="0"/>
+              <a:rPr lang="en-US"/>
               <a:t>Click to edit Master title style</a:t>
             </a:r>
             <a:endParaRPr lang="en-SG"/>
@@ -1039,35 +1039,35 @@
           <a:p>
             <a:pPr lvl="0"/>
             <a:r>
-              <a:rPr lang="en-US" smtClean="0"/>
+              <a:rPr lang="en-US"/>
               <a:t>Click to edit Master text styles</a:t>
             </a:r>
           </a:p>
           <a:p>
             <a:pPr lvl="1"/>
             <a:r>
-              <a:rPr lang="en-US" smtClean="0"/>
+              <a:rPr lang="en-US"/>
               <a:t>Second level</a:t>
             </a:r>
           </a:p>
           <a:p>
             <a:pPr lvl="2"/>
             <a:r>
-              <a:rPr lang="en-US" smtClean="0"/>
+              <a:rPr lang="en-US"/>
               <a:t>Third level</a:t>
             </a:r>
           </a:p>
           <a:p>
             <a:pPr lvl="3"/>
             <a:r>
-              <a:rPr lang="en-US" smtClean="0"/>
+              <a:rPr lang="en-US"/>
               <a:t>Fourth level</a:t>
             </a:r>
           </a:p>
           <a:p>
             <a:pPr lvl="4"/>
             <a:r>
-              <a:rPr lang="en-US" smtClean="0"/>
+              <a:rPr lang="en-US"/>
               <a:t>Fifth level</a:t>
             </a:r>
             <a:endParaRPr lang="en-SG"/>
@@ -1091,7 +1091,7 @@
           <a:p>
             <a:fld id="{8486F480-15A6-4026-BC99-052F8E994139}" type="datetimeFigureOut">
               <a:rPr lang="en-SG" smtClean="0"/>
-              <a:t>17/10/2020</a:t>
+              <a:t>1/1/26</a:t>
             </a:fld>
             <a:endParaRPr lang="en-SG"/>
           </a:p>
@@ -1185,7 +1185,7 @@
           <a:lstStyle/>
           <a:p>
             <a:r>
-              <a:rPr lang="en-US" smtClean="0"/>
+              <a:rPr lang="en-US"/>
               <a:t>Click to edit Master title style</a:t>
             </a:r>
             <a:endParaRPr lang="en-SG"/>
@@ -1209,35 +1209,35 @@
           <a:p>
             <a:pPr lvl="0"/>
             <a:r>
-              <a:rPr lang="en-US" smtClean="0"/>
+              <a:rPr lang="en-US"/>
               <a:t>Click to edit Master text styles</a:t>
             </a:r>
           </a:p>
           <a:p>
             <a:pPr lvl="1"/>
             <a:r>
-              <a:rPr lang="en-US" smtClean="0"/>
+              <a:rPr lang="en-US"/>
               <a:t>Second level</a:t>
             </a:r>
           </a:p>
           <a:p>
             <a:pPr lvl="2"/>
             <a:r>
-              <a:rPr lang="en-US" smtClean="0"/>
+              <a:rPr lang="en-US"/>
               <a:t>Third level</a:t>
             </a:r>
           </a:p>
           <a:p>
             <a:pPr lvl="3"/>
             <a:r>
-              <a:rPr lang="en-US" smtClean="0"/>
+              <a:rPr lang="en-US"/>
               <a:t>Fourth level</a:t>
             </a:r>
           </a:p>
           <a:p>
             <a:pPr lvl="4"/>
             <a:r>
-              <a:rPr lang="en-US" smtClean="0"/>
+              <a:rPr lang="en-US"/>
               <a:t>Fifth level</a:t>
             </a:r>
             <a:endParaRPr lang="en-SG"/>
@@ -1261,7 +1261,7 @@
           <a:p>
             <a:fld id="{8486F480-15A6-4026-BC99-052F8E994139}" type="datetimeFigureOut">
               <a:rPr lang="en-SG" smtClean="0"/>
-              <a:t>17/10/2020</a:t>
+              <a:t>1/1/26</a:t>
             </a:fld>
             <a:endParaRPr lang="en-SG"/>
           </a:p>
@@ -1364,7 +1364,7 @@
           </a:lstStyle>
           <a:p>
             <a:r>
-              <a:rPr lang="en-US" smtClean="0"/>
+              <a:rPr lang="en-US"/>
               <a:t>Click to edit Master title style</a:t>
             </a:r>
             <a:endParaRPr lang="en-SG"/>
@@ -1484,7 +1484,7 @@
           <a:p>
             <a:pPr lvl="0"/>
             <a:r>
-              <a:rPr lang="en-US" smtClean="0"/>
+              <a:rPr lang="en-US"/>
               <a:t>Click to edit Master text styles</a:t>
             </a:r>
           </a:p>
@@ -1507,7 +1507,7 @@
           <a:p>
             <a:fld id="{8486F480-15A6-4026-BC99-052F8E994139}" type="datetimeFigureOut">
               <a:rPr lang="en-SG" smtClean="0"/>
-              <a:t>17/10/2020</a:t>
+              <a:t>1/1/26</a:t>
             </a:fld>
             <a:endParaRPr lang="en-SG"/>
           </a:p>
@@ -1601,7 +1601,7 @@
           <a:lstStyle/>
           <a:p>
             <a:r>
-              <a:rPr lang="en-US" smtClean="0"/>
+              <a:rPr lang="en-US"/>
               <a:t>Click to edit Master title style</a:t>
             </a:r>
             <a:endParaRPr lang="en-SG"/>
@@ -1658,35 +1658,35 @@
           <a:p>
             <a:pPr lvl="0"/>
             <a:r>
-              <a:rPr lang="en-US" smtClean="0"/>
+              <a:rPr lang="en-US"/>
               <a:t>Click to edit Master text styles</a:t>
             </a:r>
           </a:p>
           <a:p>
             <a:pPr lvl="1"/>
             <a:r>
-              <a:rPr lang="en-US" smtClean="0"/>
+              <a:rPr lang="en-US"/>
               <a:t>Second level</a:t>
             </a:r>
           </a:p>
           <a:p>
             <a:pPr lvl="2"/>
             <a:r>
-              <a:rPr lang="en-US" smtClean="0"/>
+              <a:rPr lang="en-US"/>
               <a:t>Third level</a:t>
             </a:r>
           </a:p>
           <a:p>
             <a:pPr lvl="3"/>
             <a:r>
-              <a:rPr lang="en-US" smtClean="0"/>
+              <a:rPr lang="en-US"/>
               <a:t>Fourth level</a:t>
             </a:r>
           </a:p>
           <a:p>
             <a:pPr lvl="4"/>
             <a:r>
-              <a:rPr lang="en-US" smtClean="0"/>
+              <a:rPr lang="en-US"/>
               <a:t>Fifth level</a:t>
             </a:r>
             <a:endParaRPr lang="en-SG"/>
@@ -1743,35 +1743,35 @@
           <a:p>
             <a:pPr lvl="0"/>
             <a:r>
-              <a:rPr lang="en-US" smtClean="0"/>
+              <a:rPr lang="en-US"/>
               <a:t>Click to edit Master text styles</a:t>
             </a:r>
           </a:p>
           <a:p>
             <a:pPr lvl="1"/>
             <a:r>
-              <a:rPr lang="en-US" smtClean="0"/>
+              <a:rPr lang="en-US"/>
               <a:t>Second level</a:t>
             </a:r>
           </a:p>
           <a:p>
             <a:pPr lvl="2"/>
             <a:r>
-              <a:rPr lang="en-US" smtClean="0"/>
+              <a:rPr lang="en-US"/>
               <a:t>Third level</a:t>
             </a:r>
           </a:p>
           <a:p>
             <a:pPr lvl="3"/>
             <a:r>
-              <a:rPr lang="en-US" smtClean="0"/>
+              <a:rPr lang="en-US"/>
               <a:t>Fourth level</a:t>
             </a:r>
           </a:p>
           <a:p>
             <a:pPr lvl="4"/>
             <a:r>
-              <a:rPr lang="en-US" smtClean="0"/>
+              <a:rPr lang="en-US"/>
               <a:t>Fifth level</a:t>
             </a:r>
             <a:endParaRPr lang="en-SG"/>
@@ -1795,7 +1795,7 @@
           <a:p>
             <a:fld id="{8486F480-15A6-4026-BC99-052F8E994139}" type="datetimeFigureOut">
               <a:rPr lang="en-SG" smtClean="0"/>
-              <a:t>17/10/2020</a:t>
+              <a:t>1/1/26</a:t>
             </a:fld>
             <a:endParaRPr lang="en-SG"/>
           </a:p>
@@ -1893,7 +1893,7 @@
           </a:lstStyle>
           <a:p>
             <a:r>
-              <a:rPr lang="en-US" smtClean="0"/>
+              <a:rPr lang="en-US"/>
               <a:t>Click to edit Master title style</a:t>
             </a:r>
             <a:endParaRPr lang="en-SG"/>
@@ -1959,7 +1959,7 @@
           <a:p>
             <a:pPr lvl="0"/>
             <a:r>
-              <a:rPr lang="en-US" smtClean="0"/>
+              <a:rPr lang="en-US"/>
               <a:t>Click to edit Master text styles</a:t>
             </a:r>
           </a:p>
@@ -2015,35 +2015,35 @@
           <a:p>
             <a:pPr lvl="0"/>
             <a:r>
-              <a:rPr lang="en-US" smtClean="0"/>
+              <a:rPr lang="en-US"/>
               <a:t>Click to edit Master text styles</a:t>
             </a:r>
           </a:p>
           <a:p>
             <a:pPr lvl="1"/>
             <a:r>
-              <a:rPr lang="en-US" smtClean="0"/>
+              <a:rPr lang="en-US"/>
               <a:t>Second level</a:t>
             </a:r>
           </a:p>
           <a:p>
             <a:pPr lvl="2"/>
             <a:r>
-              <a:rPr lang="en-US" smtClean="0"/>
+              <a:rPr lang="en-US"/>
               <a:t>Third level</a:t>
             </a:r>
           </a:p>
           <a:p>
             <a:pPr lvl="3"/>
             <a:r>
-              <a:rPr lang="en-US" smtClean="0"/>
+              <a:rPr lang="en-US"/>
               <a:t>Fourth level</a:t>
             </a:r>
           </a:p>
           <a:p>
             <a:pPr lvl="4"/>
             <a:r>
-              <a:rPr lang="en-US" smtClean="0"/>
+              <a:rPr lang="en-US"/>
               <a:t>Fifth level</a:t>
             </a:r>
             <a:endParaRPr lang="en-SG"/>
@@ -2109,7 +2109,7 @@
           <a:p>
             <a:pPr lvl="0"/>
             <a:r>
-              <a:rPr lang="en-US" smtClean="0"/>
+              <a:rPr lang="en-US"/>
               <a:t>Click to edit Master text styles</a:t>
             </a:r>
           </a:p>
@@ -2165,35 +2165,35 @@
           <a:p>
             <a:pPr lvl="0"/>
             <a:r>
-              <a:rPr lang="en-US" smtClean="0"/>
+              <a:rPr lang="en-US"/>
               <a:t>Click to edit Master text styles</a:t>
             </a:r>
           </a:p>
           <a:p>
             <a:pPr lvl="1"/>
             <a:r>
-              <a:rPr lang="en-US" smtClean="0"/>
+              <a:rPr lang="en-US"/>
               <a:t>Second level</a:t>
             </a:r>
           </a:p>
           <a:p>
             <a:pPr lvl="2"/>
             <a:r>
-              <a:rPr lang="en-US" smtClean="0"/>
+              <a:rPr lang="en-US"/>
               <a:t>Third level</a:t>
             </a:r>
           </a:p>
           <a:p>
             <a:pPr lvl="3"/>
             <a:r>
-              <a:rPr lang="en-US" smtClean="0"/>
+              <a:rPr lang="en-US"/>
               <a:t>Fourth level</a:t>
             </a:r>
           </a:p>
           <a:p>
             <a:pPr lvl="4"/>
             <a:r>
-              <a:rPr lang="en-US" smtClean="0"/>
+              <a:rPr lang="en-US"/>
               <a:t>Fifth level</a:t>
             </a:r>
             <a:endParaRPr lang="en-SG"/>
@@ -2217,7 +2217,7 @@
           <a:p>
             <a:fld id="{8486F480-15A6-4026-BC99-052F8E994139}" type="datetimeFigureOut">
               <a:rPr lang="en-SG" smtClean="0"/>
-              <a:t>17/10/2020</a:t>
+              <a:t>1/1/26</a:t>
             </a:fld>
             <a:endParaRPr lang="en-SG"/>
           </a:p>
@@ -2311,7 +2311,7 @@
           <a:lstStyle/>
           <a:p>
             <a:r>
-              <a:rPr lang="en-US" smtClean="0"/>
+              <a:rPr lang="en-US"/>
               <a:t>Click to edit Master title style</a:t>
             </a:r>
             <a:endParaRPr lang="en-SG"/>
@@ -2335,7 +2335,7 @@
           <a:p>
             <a:fld id="{8486F480-15A6-4026-BC99-052F8E994139}" type="datetimeFigureOut">
               <a:rPr lang="en-SG" smtClean="0"/>
-              <a:t>17/10/2020</a:t>
+              <a:t>1/1/26</a:t>
             </a:fld>
             <a:endParaRPr lang="en-SG"/>
           </a:p>
@@ -2430,7 +2430,7 @@
           <a:p>
             <a:fld id="{8486F480-15A6-4026-BC99-052F8E994139}" type="datetimeFigureOut">
               <a:rPr lang="en-SG" smtClean="0"/>
-              <a:t>17/10/2020</a:t>
+              <a:t>1/1/26</a:t>
             </a:fld>
             <a:endParaRPr lang="en-SG"/>
           </a:p>
@@ -2533,7 +2533,7 @@
           </a:lstStyle>
           <a:p>
             <a:r>
-              <a:rPr lang="en-US" smtClean="0"/>
+              <a:rPr lang="en-US"/>
               <a:t>Click to edit Master title style</a:t>
             </a:r>
             <a:endParaRPr lang="en-SG"/>
@@ -2590,35 +2590,35 @@
           <a:p>
             <a:pPr lvl="0"/>
             <a:r>
-              <a:rPr lang="en-US" smtClean="0"/>
+              <a:rPr lang="en-US"/>
               <a:t>Click to edit Master text styles</a:t>
             </a:r>
           </a:p>
           <a:p>
             <a:pPr lvl="1"/>
             <a:r>
-              <a:rPr lang="en-US" smtClean="0"/>
+              <a:rPr lang="en-US"/>
               <a:t>Second level</a:t>
             </a:r>
           </a:p>
           <a:p>
             <a:pPr lvl="2"/>
             <a:r>
-              <a:rPr lang="en-US" smtClean="0"/>
+              <a:rPr lang="en-US"/>
               <a:t>Third level</a:t>
             </a:r>
           </a:p>
           <a:p>
             <a:pPr lvl="3"/>
             <a:r>
-              <a:rPr lang="en-US" smtClean="0"/>
+              <a:rPr lang="en-US"/>
               <a:t>Fourth level</a:t>
             </a:r>
           </a:p>
           <a:p>
             <a:pPr lvl="4"/>
             <a:r>
-              <a:rPr lang="en-US" smtClean="0"/>
+              <a:rPr lang="en-US"/>
               <a:t>Fifth level</a:t>
             </a:r>
             <a:endParaRPr lang="en-SG"/>
@@ -2684,7 +2684,7 @@
           <a:p>
             <a:pPr lvl="0"/>
             <a:r>
-              <a:rPr lang="en-US" smtClean="0"/>
+              <a:rPr lang="en-US"/>
               <a:t>Click to edit Master text styles</a:t>
             </a:r>
           </a:p>
@@ -2707,7 +2707,7 @@
           <a:p>
             <a:fld id="{8486F480-15A6-4026-BC99-052F8E994139}" type="datetimeFigureOut">
               <a:rPr lang="en-SG" smtClean="0"/>
-              <a:t>17/10/2020</a:t>
+              <a:t>1/1/26</a:t>
             </a:fld>
             <a:endParaRPr lang="en-SG"/>
           </a:p>
@@ -2810,7 +2810,7 @@
           </a:lstStyle>
           <a:p>
             <a:r>
-              <a:rPr lang="en-US" smtClean="0"/>
+              <a:rPr lang="en-US"/>
               <a:t>Click to edit Master title style</a:t>
             </a:r>
             <a:endParaRPr lang="en-SG"/>
@@ -2937,7 +2937,7 @@
           <a:p>
             <a:pPr lvl="0"/>
             <a:r>
-              <a:rPr lang="en-US" smtClean="0"/>
+              <a:rPr lang="en-US"/>
               <a:t>Click to edit Master text styles</a:t>
             </a:r>
           </a:p>
@@ -2960,7 +2960,7 @@
           <a:p>
             <a:fld id="{8486F480-15A6-4026-BC99-052F8E994139}" type="datetimeFigureOut">
               <a:rPr lang="en-SG" smtClean="0"/>
-              <a:t>17/10/2020</a:t>
+              <a:t>1/1/26</a:t>
             </a:fld>
             <a:endParaRPr lang="en-SG"/>
           </a:p>
@@ -3069,7 +3069,7 @@
           <a:lstStyle/>
           <a:p>
             <a:r>
-              <a:rPr lang="en-US" smtClean="0"/>
+              <a:rPr lang="en-US"/>
               <a:t>Click to edit Master title style</a:t>
             </a:r>
             <a:endParaRPr lang="en-SG"/>
@@ -3103,35 +3103,35 @@
           <a:p>
             <a:pPr lvl="0"/>
             <a:r>
-              <a:rPr lang="en-US" smtClean="0"/>
+              <a:rPr lang="en-US"/>
               <a:t>Click to edit Master text styles</a:t>
             </a:r>
           </a:p>
           <a:p>
             <a:pPr lvl="1"/>
             <a:r>
-              <a:rPr lang="en-US" smtClean="0"/>
+              <a:rPr lang="en-US"/>
               <a:t>Second level</a:t>
             </a:r>
           </a:p>
           <a:p>
             <a:pPr lvl="2"/>
             <a:r>
-              <a:rPr lang="en-US" smtClean="0"/>
+              <a:rPr lang="en-US"/>
               <a:t>Third level</a:t>
             </a:r>
           </a:p>
           <a:p>
             <a:pPr lvl="3"/>
             <a:r>
-              <a:rPr lang="en-US" smtClean="0"/>
+              <a:rPr lang="en-US"/>
               <a:t>Fourth level</a:t>
             </a:r>
           </a:p>
           <a:p>
             <a:pPr lvl="4"/>
             <a:r>
-              <a:rPr lang="en-US" smtClean="0"/>
+              <a:rPr lang="en-US"/>
               <a:t>Fifth level</a:t>
             </a:r>
             <a:endParaRPr lang="en-SG"/>
@@ -3173,7 +3173,7 @@
           <a:p>
             <a:fld id="{8486F480-15A6-4026-BC99-052F8E994139}" type="datetimeFigureOut">
               <a:rPr lang="en-SG" smtClean="0"/>
-              <a:t>17/10/2020</a:t>
+              <a:t>1/1/26</a:t>
             </a:fld>
             <a:endParaRPr lang="en-SG"/>
           </a:p>
@@ -3564,7 +3564,7 @@
           <a:prstGeom prst="line">
             <a:avLst/>
           </a:prstGeom>
-          <a:ln>
+          <a:ln w="12700">
             <a:prstDash val="dash"/>
             <a:tailEnd type="arrow"/>
           </a:ln>
@@ -3635,7 +3635,7 @@
           <a:lstStyle/>
           <a:p>
             <a:r>
-              <a:rPr lang="en-US" sz="2000" b="0" dirty="0" smtClean="0">
+              <a:rPr lang="en-US" sz="2000" b="0" dirty="0">
                 <a:solidFill>
                   <a:schemeClr val="tx1"/>
                 </a:solidFill>
@@ -3646,7 +3646,7 @@
           </a:p>
           <a:p>
             <a:r>
-              <a:rPr lang="en-US" sz="2000" dirty="0" smtClean="0">
+              <a:rPr lang="en-US" sz="2000" dirty="0">
                 <a:solidFill>
                   <a:schemeClr val="tx1"/>
                 </a:solidFill>
@@ -3706,38 +3706,14 @@
           <a:p>
             <a:pPr algn="ctr"/>
             <a:r>
-              <a:rPr lang="en-US" sz="2000" b="0" dirty="0" smtClean="0">
+              <a:rPr lang="en-US" sz="2000" b="0" dirty="0">
                 <a:solidFill>
                   <a:schemeClr val="tx1"/>
                 </a:solidFill>
                 <a:latin typeface="Calibri" pitchFamily="34" charset="0"/>
               </a:rPr>
-              <a:t>&lt;&lt;</a:t>
-            </a:r>
-            <a:r>
-              <a:rPr lang="en-US" sz="2000" b="0" dirty="0" smtClean="0">
-                <a:solidFill>
-                  <a:schemeClr val="tx1"/>
-                </a:solidFill>
-                <a:latin typeface="Calibri" pitchFamily="34" charset="0"/>
-              </a:rPr>
-              <a:t>ConcreteCommand1</a:t>
-            </a:r>
-            <a:r>
-              <a:rPr lang="en-US" sz="2000" b="0" dirty="0" smtClean="0">
-                <a:solidFill>
-                  <a:schemeClr val="tx1"/>
-                </a:solidFill>
-                <a:latin typeface="Calibri" pitchFamily="34" charset="0"/>
-              </a:rPr>
-              <a:t>&gt;&gt;</a:t>
-            </a:r>
-            <a:endParaRPr lang="en-US" sz="2000" b="0" dirty="0">
-              <a:solidFill>
-                <a:schemeClr val="tx1"/>
-              </a:solidFill>
-              <a:latin typeface="Calibri" pitchFamily="34" charset="0"/>
-            </a:endParaRPr>
+              <a:t>&lt;&lt;ConcreteCommand1&gt;&gt;</a:t>
+            </a:r>
           </a:p>
         </p:txBody>
       </p:sp>
@@ -3812,55 +3788,6 @@
       </p:cxnSp>
       <p:sp>
         <p:nvSpPr>
-          <p:cNvPr id="179" name="Rectangle 54"/>
-          <p:cNvSpPr>
-            <a:spLocks noChangeArrowheads="1"/>
-          </p:cNvSpPr>
-          <p:nvPr/>
-        </p:nvSpPr>
-        <p:spPr bwMode="auto">
-          <a:xfrm>
-            <a:off x="1986009" y="5029200"/>
-            <a:ext cx="1047466" cy="369332"/>
-          </a:xfrm>
-          <a:prstGeom prst="rect">
-            <a:avLst/>
-          </a:prstGeom>
-          <a:noFill/>
-          <a:ln w="19050" algn="ctr">
-            <a:noFill/>
-            <a:miter lim="800000"/>
-            <a:headEnd/>
-            <a:tailEnd/>
-          </a:ln>
-        </p:spPr>
-        <p:txBody>
-          <a:bodyPr wrap="none" anchor="ctr">
-            <a:spAutoFit/>
-          </a:bodyPr>
-          <a:lstStyle/>
-          <a:p>
-            <a:pPr algn="ctr"/>
-            <a:r>
-              <a:rPr lang="en-US" sz="1800" b="0" dirty="0" smtClean="0">
-                <a:solidFill>
-                  <a:schemeClr val="tx1"/>
-                </a:solidFill>
-                <a:latin typeface="Calibri" pitchFamily="34" charset="0"/>
-              </a:rPr>
-              <a:t>creates   </a:t>
-            </a:r>
-            <a:endParaRPr lang="en-US" sz="1800" b="0" dirty="0">
-              <a:solidFill>
-                <a:schemeClr val="tx1"/>
-              </a:solidFill>
-              <a:latin typeface="Calibri" pitchFamily="34" charset="0"/>
-            </a:endParaRPr>
-          </a:p>
-        </p:txBody>
-      </p:sp>
-      <p:sp>
-        <p:nvSpPr>
           <p:cNvPr id="180" name="Rectangle 55"/>
           <p:cNvSpPr>
             <a:spLocks noChangeArrowheads="1"/>
@@ -3902,7 +3829,7 @@
           <a:p>
             <a:pPr algn="ctr"/>
             <a:r>
-              <a:rPr lang="en-US" sz="2000" b="0" dirty="0" smtClean="0">
+              <a:rPr lang="en-US" sz="2000" b="0" dirty="0">
                 <a:solidFill>
                   <a:schemeClr val="tx1"/>
                 </a:solidFill>
@@ -3910,46 +3837,9 @@
               </a:rPr>
               <a:t>&lt;&lt;Invoker&gt;&gt;</a:t>
             </a:r>
-            <a:endParaRPr lang="en-US" sz="2000" b="0" dirty="0">
-              <a:solidFill>
-                <a:schemeClr val="tx1"/>
-              </a:solidFill>
-              <a:latin typeface="Calibri" pitchFamily="34" charset="0"/>
-            </a:endParaRPr>
-          </a:p>
-        </p:txBody>
-      </p:sp>
-      <p:cxnSp>
-        <p:nvCxnSpPr>
-          <p:cNvPr id="181" name="AutoShape 57"/>
-          <p:cNvCxnSpPr>
-            <a:cxnSpLocks noChangeShapeType="1"/>
-            <a:stCxn id="180" idx="3"/>
-            <a:endCxn id="175" idx="1"/>
-          </p:cNvCxnSpPr>
-          <p:nvPr/>
-        </p:nvCxnSpPr>
-        <p:spPr bwMode="auto">
-          <a:xfrm flipV="1">
-            <a:off x="4953001" y="3504701"/>
-            <a:ext cx="1348489" cy="13661"/>
-          </a:xfrm>
-          <a:prstGeom prst="bentConnector3">
-            <a:avLst>
-              <a:gd name="adj1" fmla="val 50000"/>
-            </a:avLst>
-          </a:prstGeom>
-          <a:noFill/>
-          <a:ln w="19050">
-            <a:solidFill>
-              <a:schemeClr val="tx1"/>
-            </a:solidFill>
-            <a:miter lim="800000"/>
-            <a:headEnd/>
-            <a:tailEnd type="arrow" w="med" len="med"/>
-          </a:ln>
-        </p:spPr>
-      </p:cxnSp>
+          </a:p>
+        </p:txBody>
+      </p:sp>
       <p:sp>
         <p:nvSpPr>
           <p:cNvPr id="182" name="Rectangle 58"/>
@@ -3993,7 +3883,7 @@
           <a:p>
             <a:pPr algn="ctr"/>
             <a:r>
-              <a:rPr lang="en-US" sz="2000" b="0" dirty="0" smtClean="0">
+              <a:rPr lang="en-US" sz="2000" b="0" dirty="0">
                 <a:solidFill>
                   <a:schemeClr val="tx1"/>
                 </a:solidFill>
@@ -4001,12 +3891,6 @@
               </a:rPr>
               <a:t>&lt;&lt;Receiver&gt;&gt;</a:t>
             </a:r>
-            <a:endParaRPr lang="en-US" sz="2000" b="0" dirty="0">
-              <a:solidFill>
-                <a:schemeClr val="tx1"/>
-              </a:solidFill>
-              <a:latin typeface="Calibri" pitchFamily="34" charset="0"/>
-            </a:endParaRPr>
           </a:p>
         </p:txBody>
       </p:sp>
@@ -4175,7 +4059,7 @@
           <a:p>
             <a:pPr algn="ctr"/>
             <a:r>
-              <a:rPr lang="en-US" sz="2000" b="0" dirty="0" smtClean="0">
+              <a:rPr lang="en-US" sz="2000" b="0" dirty="0">
                 <a:solidFill>
                   <a:schemeClr val="tx1"/>
                 </a:solidFill>
@@ -4183,12 +4067,6 @@
               </a:rPr>
               <a:t>&lt;&lt;Command&gt;&gt;</a:t>
             </a:r>
-            <a:endParaRPr lang="en-US" sz="2000" b="0" dirty="0">
-              <a:solidFill>
-                <a:schemeClr val="tx1"/>
-              </a:solidFill>
-              <a:latin typeface="Calibri" pitchFamily="34" charset="0"/>
-            </a:endParaRPr>
           </a:p>
         </p:txBody>
       </p:sp>
@@ -4235,7 +4113,7 @@
           <a:p>
             <a:pPr algn="ctr"/>
             <a:r>
-              <a:rPr lang="en-US" sz="2000" b="0" dirty="0" smtClean="0">
+              <a:rPr lang="en-US" sz="2000" b="0" dirty="0">
                 <a:solidFill>
                   <a:schemeClr val="tx1"/>
                 </a:solidFill>
@@ -4243,12 +4121,6 @@
               </a:rPr>
               <a:t>&lt;&lt;Client&gt;&gt; </a:t>
             </a:r>
-            <a:endParaRPr lang="en-US" sz="2000" b="0" dirty="0">
-              <a:solidFill>
-                <a:schemeClr val="tx1"/>
-              </a:solidFill>
-              <a:latin typeface="Calibri" pitchFamily="34" charset="0"/>
-            </a:endParaRPr>
           </a:p>
         </p:txBody>
       </p:sp>
@@ -4270,7 +4142,7 @@
               <a:gd name="adj1" fmla="val -740"/>
             </a:avLst>
           </a:prstGeom>
-          <a:ln>
+          <a:ln w="12700">
             <a:prstDash val="dash"/>
             <a:tailEnd type="arrow"/>
           </a:ln>
@@ -4322,7 +4194,7 @@
           <a:p>
             <a:pPr algn="ctr"/>
             <a:r>
-              <a:rPr lang="en-US" sz="1800" b="0" dirty="0" smtClean="0">
+              <a:rPr lang="en-US" sz="1800" b="0" dirty="0">
                 <a:solidFill>
                   <a:schemeClr val="tx1"/>
                 </a:solidFill>
@@ -4331,16 +4203,10 @@
               <a:t>adds </a:t>
             </a:r>
             <a:r>
-              <a:rPr lang="en-US" sz="1800" dirty="0" smtClean="0">
+              <a:rPr lang="en-US" sz="1800" dirty="0">
                 <a:latin typeface="Calibri" pitchFamily="34" charset="0"/>
               </a:rPr>
-              <a:t>Command objects </a:t>
-            </a:r>
-            <a:r>
-              <a:rPr lang="en-US" sz="1800" dirty="0" smtClean="0">
-                <a:latin typeface="Calibri" pitchFamily="34" charset="0"/>
-              </a:rPr>
-              <a:t>to  </a:t>
+              <a:t>Command objects to  </a:t>
             </a:r>
             <a:endParaRPr lang="en-US" sz="1800" b="0" dirty="0">
               <a:solidFill>
@@ -4393,7 +4259,7 @@
           <a:lstStyle/>
           <a:p>
             <a:r>
-              <a:rPr lang="en-US" sz="2000" b="0" dirty="0" smtClean="0">
+              <a:rPr lang="en-US" sz="2000" b="0" dirty="0">
                 <a:solidFill>
                   <a:schemeClr val="tx1"/>
                 </a:solidFill>
@@ -4401,12 +4267,6 @@
               </a:rPr>
               <a:t>add(Command)</a:t>
             </a:r>
-            <a:endParaRPr lang="en-US" sz="2000" b="0" dirty="0">
-              <a:solidFill>
-                <a:schemeClr val="tx1"/>
-              </a:solidFill>
-              <a:latin typeface="Calibri" pitchFamily="34" charset="0"/>
-            </a:endParaRPr>
           </a:p>
         </p:txBody>
       </p:sp>
@@ -4471,7 +4331,7 @@
           <a:p>
             <a:pPr algn="ctr"/>
             <a:r>
-              <a:rPr lang="en-US" sz="1800" b="0" dirty="0" smtClean="0">
+              <a:rPr lang="en-US" sz="1800" b="0" dirty="0">
                 <a:solidFill>
                   <a:schemeClr val="tx1"/>
                 </a:solidFill>
@@ -4479,12 +4339,6 @@
               </a:rPr>
               <a:t>executes</a:t>
             </a:r>
-            <a:endParaRPr lang="en-US" sz="1800" b="0" dirty="0">
-              <a:solidFill>
-                <a:schemeClr val="tx1"/>
-              </a:solidFill>
-              <a:latin typeface="Calibri" pitchFamily="34" charset="0"/>
-            </a:endParaRPr>
           </a:p>
         </p:txBody>
       </p:sp>
@@ -4520,7 +4374,7 @@
           <a:p>
             <a:pPr algn="ctr"/>
             <a:r>
-              <a:rPr lang="en-US" sz="1800" b="0" dirty="0" smtClean="0">
+              <a:rPr lang="en-US" sz="1800" b="0" dirty="0">
                 <a:solidFill>
                   <a:schemeClr val="tx1"/>
                 </a:solidFill>
@@ -4528,12 +4382,6 @@
               </a:rPr>
               <a:t>receiver</a:t>
             </a:r>
-            <a:endParaRPr lang="en-US" sz="1800" b="0" dirty="0">
-              <a:solidFill>
-                <a:schemeClr val="tx1"/>
-              </a:solidFill>
-              <a:latin typeface="Calibri" pitchFamily="34" charset="0"/>
-            </a:endParaRPr>
           </a:p>
         </p:txBody>
       </p:sp>
@@ -4585,52 +4433,6 @@
       </p:sp>
       <p:sp>
         <p:nvSpPr>
-          <p:cNvPr id="24" name="Isosceles Triangle 23"/>
-          <p:cNvSpPr/>
-          <p:nvPr/>
-        </p:nvSpPr>
-        <p:spPr>
-          <a:xfrm rot="5400000">
-            <a:off x="2794872" y="5190325"/>
-            <a:ext cx="178532" cy="108202"/>
-          </a:xfrm>
-          <a:prstGeom prst="triangle">
-            <a:avLst/>
-          </a:prstGeom>
-          <a:solidFill>
-            <a:schemeClr val="tx1"/>
-          </a:solidFill>
-          <a:ln>
-            <a:noFill/>
-          </a:ln>
-        </p:spPr>
-        <p:style>
-          <a:lnRef idx="2">
-            <a:schemeClr val="accent1">
-              <a:shade val="50000"/>
-            </a:schemeClr>
-          </a:lnRef>
-          <a:fillRef idx="1">
-            <a:schemeClr val="accent1"/>
-          </a:fillRef>
-          <a:effectRef idx="0">
-            <a:schemeClr val="accent1"/>
-          </a:effectRef>
-          <a:fontRef idx="minor">
-            <a:schemeClr val="lt1"/>
-          </a:fontRef>
-        </p:style>
-        <p:txBody>
-          <a:bodyPr rtlCol="0" anchor="ctr"/>
-          <a:lstStyle/>
-          <a:p>
-            <a:pPr algn="ctr"/>
-            <a:endParaRPr lang="en-US"/>
-          </a:p>
-        </p:txBody>
-      </p:sp>
-      <p:sp>
-        <p:nvSpPr>
           <p:cNvPr id="25" name="Isosceles Triangle 24"/>
           <p:cNvSpPr/>
           <p:nvPr/>
@@ -4675,6 +4477,88 @@
           </a:p>
         </p:txBody>
       </p:sp>
+      <p:sp>
+        <p:nvSpPr>
+          <p:cNvPr id="2" name="Rectangle 54">
+            <a:extLst>
+              <a:ext uri="{FF2B5EF4-FFF2-40B4-BE49-F238E27FC236}">
+                <a16:creationId xmlns:a16="http://schemas.microsoft.com/office/drawing/2014/main" id="{0C38A282-CF42-51AA-7323-A7B2EC07B014}"/>
+              </a:ext>
+            </a:extLst>
+          </p:cNvPr>
+          <p:cNvSpPr>
+            <a:spLocks noChangeArrowheads="1"/>
+          </p:cNvSpPr>
+          <p:nvPr/>
+        </p:nvSpPr>
+        <p:spPr bwMode="auto">
+          <a:xfrm>
+            <a:off x="2771800" y="5013176"/>
+            <a:ext cx="1235018" cy="369332"/>
+          </a:xfrm>
+          <a:prstGeom prst="rect">
+            <a:avLst/>
+          </a:prstGeom>
+          <a:noFill/>
+          <a:ln w="19050" algn="ctr">
+            <a:noFill/>
+            <a:miter lim="800000"/>
+            <a:headEnd/>
+            <a:tailEnd/>
+          </a:ln>
+        </p:spPr>
+        <p:txBody>
+          <a:bodyPr wrap="none" anchor="ctr">
+            <a:spAutoFit/>
+          </a:bodyPr>
+          <a:lstStyle/>
+          <a:p>
+            <a:pPr algn="ctr"/>
+            <a:r>
+              <a:rPr lang="en-US" sz="1800" b="0" dirty="0">
+                <a:solidFill>
+                  <a:schemeClr val="tx1"/>
+                </a:solidFill>
+                <a:latin typeface="Calibri" pitchFamily="34" charset="0"/>
+              </a:rPr>
+              <a:t>&lt;&lt;create&gt;&gt;</a:t>
+            </a:r>
+          </a:p>
+        </p:txBody>
+      </p:sp>
+      <p:cxnSp>
+        <p:nvCxnSpPr>
+          <p:cNvPr id="5" name="AutoShape 59">
+            <a:extLst>
+              <a:ext uri="{FF2B5EF4-FFF2-40B4-BE49-F238E27FC236}">
+                <a16:creationId xmlns:a16="http://schemas.microsoft.com/office/drawing/2014/main" id="{18D2D7CA-F622-0218-5CE2-BC477C73BFEB}"/>
+              </a:ext>
+            </a:extLst>
+          </p:cNvPr>
+          <p:cNvCxnSpPr>
+            <a:cxnSpLocks noChangeShapeType="1"/>
+          </p:cNvCxnSpPr>
+          <p:nvPr/>
+        </p:nvCxnSpPr>
+        <p:spPr bwMode="auto">
+          <a:xfrm>
+            <a:off x="5004048" y="3501008"/>
+            <a:ext cx="1296144" cy="0"/>
+          </a:xfrm>
+          <a:prstGeom prst="straightConnector1">
+            <a:avLst/>
+          </a:prstGeom>
+          <a:noFill/>
+          <a:ln w="19050">
+            <a:solidFill>
+              <a:srgbClr val="002060"/>
+            </a:solidFill>
+            <a:round/>
+            <a:headEnd type="none" w="med" len="med"/>
+            <a:tailEnd type="arrow" w="med" len="med"/>
+          </a:ln>
+        </p:spPr>
+      </p:cxnSp>
     </p:spTree>
     <p:extLst>
       <p:ext uri="{BB962C8B-B14F-4D97-AF65-F5344CB8AC3E}">
@@ -4685,13 +4569,6 @@
   <p:clrMapOvr>
     <a:masterClrMapping/>
   </p:clrMapOvr>
-  <p:timing>
-    <p:tnLst>
-      <p:par>
-        <p:cTn id="1" dur="indefinite" restart="never" nodeType="tmRoot"/>
-      </p:par>
-    </p:tnLst>
-  </p:timing>
 </p:sld>
 </file>
 

</xml_diff>